<commit_message>
Arne toegevoed in ppt
</commit_message>
<xml_diff>
--- a/Presentaties/4Wekelijkse PowerPoint/ppt_enocean_.pptx
+++ b/Presentaties/4Wekelijkse PowerPoint/ppt_enocean_.pptx
@@ -4241,13 +4241,23 @@
             </a:pPr>
             <a:r>
               <a:rPr lang="nl-BE" dirty="0"/>
-              <a:t>Bart </a:t>
-            </a:r>
-            <a:r>
-              <a:rPr lang="nl-BE" dirty="0" err="1"/>
-              <a:t>Grispen</a:t>
-            </a:r>
-            <a:endParaRPr lang="nl-BE" dirty="0"/>
+              <a:t>Bart Grispen</a:t>
+            </a:r>
+          </a:p>
+          <a:p>
+            <a:pPr marL="0" lvl="0" indent="0" algn="r" rtl="0">
+              <a:spcBef>
+                <a:spcPts val="0"/>
+              </a:spcBef>
+              <a:spcAft>
+                <a:spcPts val="0"/>
+              </a:spcAft>
+              <a:buNone/>
+            </a:pPr>
+            <a:r>
+              <a:rPr lang="nl-BE" dirty="0"/>
+              <a:t>Arne Dubois</a:t>
+            </a:r>
           </a:p>
           <a:p>
             <a:pPr marL="0" lvl="0" indent="0" algn="r" rtl="0">

</xml_diff>